<commit_message>
added a slide in intro ppt
</commit_message>
<xml_diff>
--- a/1 Introduction.ppt.pptx
+++ b/1 Introduction.ppt.pptx
@@ -5,10 +5,10 @@
     <p:sldMasterId id="2147483648" r:id="rId1"/>
   </p:sldMasterIdLst>
   <p:notesMasterIdLst>
-    <p:notesMasterId r:id="rId26"/>
+    <p:notesMasterId r:id="rId27"/>
   </p:notesMasterIdLst>
   <p:handoutMasterIdLst>
-    <p:handoutMasterId r:id="rId27"/>
+    <p:handoutMasterId r:id="rId28"/>
   </p:handoutMasterIdLst>
   <p:sldIdLst>
     <p:sldId id="258" r:id="rId2"/>
@@ -34,7 +34,8 @@
     <p:sldId id="570" r:id="rId22"/>
     <p:sldId id="571" r:id="rId23"/>
     <p:sldId id="573" r:id="rId24"/>
-    <p:sldId id="321" r:id="rId25"/>
+    <p:sldId id="575" r:id="rId25"/>
+    <p:sldId id="321" r:id="rId26"/>
   </p:sldIdLst>
   <p:sldSz cx="9144000" cy="6858000" type="screen4x3"/>
   <p:notesSz cx="6858000" cy="9144000"/>
@@ -260,7 +261,7 @@
           <a:p>
             <a:fld id="{6C9E515B-7AC2-4715-99E1-EE787AB1A657}" type="datetimeFigureOut">
               <a:rPr lang="en-IN" smtClean="0"/>
-              <a:t>12-02-2024</a:t>
+              <a:t>28-02-2024</a:t>
             </a:fld>
             <a:endParaRPr lang="en-IN"/>
           </a:p>
@@ -456,7 +457,7 @@
           <a:p>
             <a:fld id="{49B8D1A0-5383-48A1-9A52-7C70D778F3F1}" type="datetimeFigureOut">
               <a:rPr lang="en-IN" smtClean="0"/>
-              <a:t>12-02-2024</a:t>
+              <a:t>28-02-2024</a:t>
             </a:fld>
             <a:endParaRPr lang="en-IN"/>
           </a:p>
@@ -24621,6 +24622,509 @@
   <p:cSld>
     <p:spTree>
       <p:nvGrpSpPr>
+        <p:cNvPr id="1" name="">
+          <a:extLst>
+            <a:ext uri="{FF2B5EF4-FFF2-40B4-BE49-F238E27FC236}">
+              <a16:creationId xmlns:a16="http://schemas.microsoft.com/office/drawing/2014/main" id="{04925F58-8706-E5C7-51A4-84E3C7676D7C}"/>
+            </a:ext>
+          </a:extLst>
+        </p:cNvPr>
+        <p:cNvGrpSpPr/>
+        <p:nvPr/>
+      </p:nvGrpSpPr>
+      <p:grpSpPr>
+        <a:xfrm>
+          <a:off x="0" y="0"/>
+          <a:ext cx="0" cy="0"/>
+          <a:chOff x="0" y="0"/>
+          <a:chExt cx="0" cy="0"/>
+        </a:xfrm>
+      </p:grpSpPr>
+      <p:grpSp>
+        <p:nvGrpSpPr>
+          <p:cNvPr id="5" name="Group 4">
+            <a:extLst>
+              <a:ext uri="{FF2B5EF4-FFF2-40B4-BE49-F238E27FC236}">
+                <a16:creationId xmlns:a16="http://schemas.microsoft.com/office/drawing/2014/main" id="{8219AAAD-C7A6-E2F8-FF8F-8DA02A7A3D70}"/>
+              </a:ext>
+            </a:extLst>
+          </p:cNvPr>
+          <p:cNvGrpSpPr>
+            <a:grpSpLocks/>
+          </p:cNvGrpSpPr>
+          <p:nvPr/>
+        </p:nvGrpSpPr>
+        <p:grpSpPr bwMode="auto">
+          <a:xfrm>
+            <a:off x="95624" y="116632"/>
+            <a:ext cx="1368151" cy="5864007"/>
+            <a:chOff x="0" y="-22667"/>
+            <a:chExt cx="12311743" cy="6903334"/>
+          </a:xfrm>
+        </p:grpSpPr>
+        <p:sp>
+          <p:nvSpPr>
+            <p:cNvPr id="6" name="Rectangle 5">
+              <a:extLst>
+                <a:ext uri="{FF2B5EF4-FFF2-40B4-BE49-F238E27FC236}">
+                  <a16:creationId xmlns:a16="http://schemas.microsoft.com/office/drawing/2014/main" id="{B45F5126-B8C0-7BA0-C17E-F068EE036484}"/>
+                </a:ext>
+              </a:extLst>
+            </p:cNvPr>
+            <p:cNvSpPr/>
+            <p:nvPr/>
+          </p:nvSpPr>
+          <p:spPr>
+            <a:xfrm>
+              <a:off x="0" y="-22667"/>
+              <a:ext cx="12191367" cy="6857291"/>
+            </a:xfrm>
+            <a:prstGeom prst="rect">
+              <a:avLst/>
+            </a:prstGeom>
+            <a:gradFill flip="none" rotWithShape="1">
+              <a:gsLst>
+                <a:gs pos="0">
+                  <a:srgbClr val="042568"/>
+                </a:gs>
+                <a:gs pos="100000">
+                  <a:srgbClr val="0C5C8D"/>
+                </a:gs>
+              </a:gsLst>
+              <a:lin ang="2700000" scaled="1"/>
+              <a:tileRect/>
+            </a:gradFill>
+          </p:spPr>
+          <p:style>
+            <a:lnRef idx="2">
+              <a:schemeClr val="accent1">
+                <a:shade val="50000"/>
+              </a:schemeClr>
+            </a:lnRef>
+            <a:fillRef idx="1">
+              <a:schemeClr val="accent1"/>
+            </a:fillRef>
+            <a:effectRef idx="0">
+              <a:schemeClr val="accent1"/>
+            </a:effectRef>
+            <a:fontRef idx="minor">
+              <a:schemeClr val="lt1"/>
+            </a:fontRef>
+          </p:style>
+          <p:txBody>
+            <a:bodyPr anchor="ctr"/>
+            <a:lstStyle/>
+            <a:p>
+              <a:pPr algn="ctr" eaLnBrk="1" fontAlgn="auto" hangingPunct="1">
+                <a:spcBef>
+                  <a:spcPts val="0"/>
+                </a:spcBef>
+                <a:spcAft>
+                  <a:spcPts val="0"/>
+                </a:spcAft>
+                <a:defRPr/>
+              </a:pPr>
+              <a:endParaRPr lang="en-ID"/>
+            </a:p>
+          </p:txBody>
+        </p:sp>
+        <p:pic>
+          <p:nvPicPr>
+            <p:cNvPr id="7" name="Picture 6" descr="A picture containing text, laser">
+              <a:extLst>
+                <a:ext uri="{FF2B5EF4-FFF2-40B4-BE49-F238E27FC236}">
+                  <a16:creationId xmlns:a16="http://schemas.microsoft.com/office/drawing/2014/main" id="{B00C402F-719F-52F2-573C-B3992A942784}"/>
+                </a:ext>
+              </a:extLst>
+            </p:cNvPr>
+            <p:cNvPicPr>
+              <a:picLocks noChangeAspect="1"/>
+            </p:cNvPicPr>
+            <p:nvPr/>
+          </p:nvPicPr>
+          <p:blipFill>
+            <a:blip r:embed="rId2">
+              <a:alphaModFix amt="20000"/>
+            </a:blip>
+            <a:srcRect t="4960" b="10997"/>
+            <a:stretch>
+              <a:fillRect/>
+            </a:stretch>
+          </p:blipFill>
+          <p:spPr>
+            <a:xfrm>
+              <a:off x="119743" y="22667"/>
+              <a:ext cx="12192000" cy="6858000"/>
+            </a:xfrm>
+            <a:custGeom>
+              <a:avLst/>
+              <a:gdLst>
+                <a:gd name="connsiteX0" fmla="*/ 0 w 12240093"/>
+                <a:gd name="connsiteY0" fmla="*/ 0 h 6858000"/>
+                <a:gd name="connsiteX1" fmla="*/ 12240093 w 12240093"/>
+                <a:gd name="connsiteY1" fmla="*/ 0 h 6858000"/>
+                <a:gd name="connsiteX2" fmla="*/ 12240093 w 12240093"/>
+                <a:gd name="connsiteY2" fmla="*/ 6858000 h 6858000"/>
+                <a:gd name="connsiteX3" fmla="*/ 0 w 12240093"/>
+                <a:gd name="connsiteY3" fmla="*/ 6858000 h 6858000"/>
+              </a:gdLst>
+              <a:ahLst/>
+              <a:cxnLst>
+                <a:cxn ang="0">
+                  <a:pos x="connsiteX0" y="connsiteY0"/>
+                </a:cxn>
+                <a:cxn ang="0">
+                  <a:pos x="connsiteX1" y="connsiteY1"/>
+                </a:cxn>
+                <a:cxn ang="0">
+                  <a:pos x="connsiteX2" y="connsiteY2"/>
+                </a:cxn>
+                <a:cxn ang="0">
+                  <a:pos x="connsiteX3" y="connsiteY3"/>
+                </a:cxn>
+              </a:cxnLst>
+              <a:rect l="l" t="t" r="r" b="b"/>
+              <a:pathLst>
+                <a:path w="12240093" h="6858000">
+                  <a:moveTo>
+                    <a:pt x="0" y="0"/>
+                  </a:moveTo>
+                  <a:lnTo>
+                    <a:pt x="12240093" y="0"/>
+                  </a:lnTo>
+                  <a:lnTo>
+                    <a:pt x="12240093" y="6858000"/>
+                  </a:lnTo>
+                  <a:lnTo>
+                    <a:pt x="0" y="6858000"/>
+                  </a:lnTo>
+                  <a:close/>
+                </a:path>
+              </a:pathLst>
+            </a:custGeom>
+          </p:spPr>
+        </p:pic>
+      </p:grpSp>
+      <p:sp>
+        <p:nvSpPr>
+          <p:cNvPr id="3" name="Content Placeholder 2">
+            <a:extLst>
+              <a:ext uri="{FF2B5EF4-FFF2-40B4-BE49-F238E27FC236}">
+                <a16:creationId xmlns:a16="http://schemas.microsoft.com/office/drawing/2014/main" id="{35CCC609-FA53-26C5-943B-89D4B3E25E6A}"/>
+              </a:ext>
+            </a:extLst>
+          </p:cNvPr>
+          <p:cNvSpPr txBox="1">
+            <a:spLocks/>
+          </p:cNvSpPr>
+          <p:nvPr/>
+        </p:nvSpPr>
+        <p:spPr>
+          <a:xfrm>
+            <a:off x="2798428" y="2420889"/>
+            <a:ext cx="4653892" cy="864096"/>
+          </a:xfrm>
+          <a:prstGeom prst="rect">
+            <a:avLst/>
+          </a:prstGeom>
+        </p:spPr>
+        <p:txBody>
+          <a:bodyPr>
+            <a:noAutofit/>
+          </a:bodyPr>
+          <a:lstStyle>
+            <a:lvl1pPr marL="342900" indent="-342900" algn="l" defTabSz="914400" rtl="0" eaLnBrk="1" latinLnBrk="0" hangingPunct="1">
+              <a:spcBef>
+                <a:spcPct val="20000"/>
+              </a:spcBef>
+              <a:buFont typeface="Arial" pitchFamily="34" charset="0"/>
+              <a:buChar char="•"/>
+              <a:defRPr sz="3200" kern="1200">
+                <a:solidFill>
+                  <a:schemeClr val="tx1"/>
+                </a:solidFill>
+                <a:latin typeface="+mn-lt"/>
+                <a:ea typeface="+mn-ea"/>
+                <a:cs typeface="+mn-cs"/>
+              </a:defRPr>
+            </a:lvl1pPr>
+            <a:lvl2pPr marL="742950" indent="-285750" algn="l" defTabSz="914400" rtl="0" eaLnBrk="1" latinLnBrk="0" hangingPunct="1">
+              <a:spcBef>
+                <a:spcPct val="20000"/>
+              </a:spcBef>
+              <a:buFont typeface="Arial" pitchFamily="34" charset="0"/>
+              <a:buChar char="–"/>
+              <a:defRPr sz="2800" kern="1200">
+                <a:solidFill>
+                  <a:schemeClr val="tx1"/>
+                </a:solidFill>
+                <a:latin typeface="+mn-lt"/>
+                <a:ea typeface="+mn-ea"/>
+                <a:cs typeface="+mn-cs"/>
+              </a:defRPr>
+            </a:lvl2pPr>
+            <a:lvl3pPr marL="1143000" indent="-228600" algn="l" defTabSz="914400" rtl="0" eaLnBrk="1" latinLnBrk="0" hangingPunct="1">
+              <a:spcBef>
+                <a:spcPct val="20000"/>
+              </a:spcBef>
+              <a:buFont typeface="Arial" pitchFamily="34" charset="0"/>
+              <a:buChar char="•"/>
+              <a:defRPr sz="2400" kern="1200">
+                <a:solidFill>
+                  <a:schemeClr val="tx1"/>
+                </a:solidFill>
+                <a:latin typeface="+mn-lt"/>
+                <a:ea typeface="+mn-ea"/>
+                <a:cs typeface="+mn-cs"/>
+              </a:defRPr>
+            </a:lvl3pPr>
+            <a:lvl4pPr marL="1600200" indent="-228600" algn="l" defTabSz="914400" rtl="0" eaLnBrk="1" latinLnBrk="0" hangingPunct="1">
+              <a:spcBef>
+                <a:spcPct val="20000"/>
+              </a:spcBef>
+              <a:buFont typeface="Arial" pitchFamily="34" charset="0"/>
+              <a:buChar char="–"/>
+              <a:defRPr sz="2000" kern="1200">
+                <a:solidFill>
+                  <a:schemeClr val="tx1"/>
+                </a:solidFill>
+                <a:latin typeface="+mn-lt"/>
+                <a:ea typeface="+mn-ea"/>
+                <a:cs typeface="+mn-cs"/>
+              </a:defRPr>
+            </a:lvl4pPr>
+            <a:lvl5pPr marL="2057400" indent="-228600" algn="l" defTabSz="914400" rtl="0" eaLnBrk="1" latinLnBrk="0" hangingPunct="1">
+              <a:spcBef>
+                <a:spcPct val="20000"/>
+              </a:spcBef>
+              <a:buFont typeface="Arial" pitchFamily="34" charset="0"/>
+              <a:buChar char="»"/>
+              <a:defRPr sz="2000" kern="1200">
+                <a:solidFill>
+                  <a:schemeClr val="tx1"/>
+                </a:solidFill>
+                <a:latin typeface="+mn-lt"/>
+                <a:ea typeface="+mn-ea"/>
+                <a:cs typeface="+mn-cs"/>
+              </a:defRPr>
+            </a:lvl5pPr>
+            <a:lvl6pPr marL="2514600" indent="-228600" algn="l" defTabSz="914400" rtl="0" eaLnBrk="1" latinLnBrk="0" hangingPunct="1">
+              <a:spcBef>
+                <a:spcPct val="20000"/>
+              </a:spcBef>
+              <a:buFont typeface="Arial" pitchFamily="34" charset="0"/>
+              <a:buChar char="•"/>
+              <a:defRPr sz="2000" kern="1200">
+                <a:solidFill>
+                  <a:schemeClr val="tx1"/>
+                </a:solidFill>
+                <a:latin typeface="+mn-lt"/>
+                <a:ea typeface="+mn-ea"/>
+                <a:cs typeface="+mn-cs"/>
+              </a:defRPr>
+            </a:lvl6pPr>
+            <a:lvl7pPr marL="2971800" indent="-228600" algn="l" defTabSz="914400" rtl="0" eaLnBrk="1" latinLnBrk="0" hangingPunct="1">
+              <a:spcBef>
+                <a:spcPct val="20000"/>
+              </a:spcBef>
+              <a:buFont typeface="Arial" pitchFamily="34" charset="0"/>
+              <a:buChar char="•"/>
+              <a:defRPr sz="2000" kern="1200">
+                <a:solidFill>
+                  <a:schemeClr val="tx1"/>
+                </a:solidFill>
+                <a:latin typeface="+mn-lt"/>
+                <a:ea typeface="+mn-ea"/>
+                <a:cs typeface="+mn-cs"/>
+              </a:defRPr>
+            </a:lvl7pPr>
+            <a:lvl8pPr marL="3429000" indent="-228600" algn="l" defTabSz="914400" rtl="0" eaLnBrk="1" latinLnBrk="0" hangingPunct="1">
+              <a:spcBef>
+                <a:spcPct val="20000"/>
+              </a:spcBef>
+              <a:buFont typeface="Arial" pitchFamily="34" charset="0"/>
+              <a:buChar char="•"/>
+              <a:defRPr sz="2000" kern="1200">
+                <a:solidFill>
+                  <a:schemeClr val="tx1"/>
+                </a:solidFill>
+                <a:latin typeface="+mn-lt"/>
+                <a:ea typeface="+mn-ea"/>
+                <a:cs typeface="+mn-cs"/>
+              </a:defRPr>
+            </a:lvl8pPr>
+            <a:lvl9pPr marL="3886200" indent="-228600" algn="l" defTabSz="914400" rtl="0" eaLnBrk="1" latinLnBrk="0" hangingPunct="1">
+              <a:spcBef>
+                <a:spcPct val="20000"/>
+              </a:spcBef>
+              <a:buFont typeface="Arial" pitchFamily="34" charset="0"/>
+              <a:buChar char="•"/>
+              <a:defRPr sz="2000" kern="1200">
+                <a:solidFill>
+                  <a:schemeClr val="tx1"/>
+                </a:solidFill>
+                <a:latin typeface="+mn-lt"/>
+                <a:ea typeface="+mn-ea"/>
+                <a:cs typeface="+mn-cs"/>
+              </a:defRPr>
+            </a:lvl9pPr>
+          </a:lstStyle>
+          <a:p>
+            <a:pPr marL="457200" indent="-457200" algn="just">
+              <a:lnSpc>
+                <a:spcPct val="150000"/>
+              </a:lnSpc>
+              <a:spcBef>
+                <a:spcPts val="0"/>
+              </a:spcBef>
+              <a:buFont typeface="Arial" pitchFamily="34" charset="0"/>
+              <a:buNone/>
+              <a:defRPr/>
+            </a:pPr>
+            <a:r>
+              <a:rPr lang="en-US" sz="4000" b="1" dirty="0">
+                <a:solidFill>
+                  <a:srgbClr val="7030A0"/>
+                </a:solidFill>
+                <a:latin typeface="Times New Roman" panose="02020603050405020304" pitchFamily="18" charset="0"/>
+                <a:cs typeface="Times New Roman" panose="02020603050405020304" pitchFamily="18" charset="0"/>
+              </a:rPr>
+              <a:t> Fill in </a:t>
+            </a:r>
+            <a:r>
+              <a:rPr lang="en-US" sz="4000" b="1">
+                <a:solidFill>
+                  <a:srgbClr val="7030A0"/>
+                </a:solidFill>
+                <a:latin typeface="Times New Roman" panose="02020603050405020304" pitchFamily="18" charset="0"/>
+                <a:cs typeface="Times New Roman" panose="02020603050405020304" pitchFamily="18" charset="0"/>
+              </a:rPr>
+              <a:t>the blanks</a:t>
+            </a:r>
+            <a:endParaRPr lang="en-US" sz="4000" b="1" dirty="0">
+              <a:solidFill>
+                <a:srgbClr val="7030A0"/>
+              </a:solidFill>
+              <a:latin typeface="Times New Roman" panose="02020603050405020304" pitchFamily="18" charset="0"/>
+              <a:cs typeface="Times New Roman" panose="02020603050405020304" pitchFamily="18" charset="0"/>
+            </a:endParaRPr>
+          </a:p>
+          <a:p>
+            <a:pPr marL="457200" indent="-457200" algn="just">
+              <a:lnSpc>
+                <a:spcPct val="150000"/>
+              </a:lnSpc>
+              <a:spcBef>
+                <a:spcPts val="0"/>
+              </a:spcBef>
+              <a:buFont typeface="Arial" pitchFamily="34" charset="0"/>
+              <a:buNone/>
+              <a:defRPr/>
+            </a:pPr>
+            <a:endParaRPr lang="en-US" sz="4000" dirty="0">
+              <a:latin typeface="Times New Roman" panose="02020603050405020304" pitchFamily="18" charset="0"/>
+              <a:cs typeface="Times New Roman" panose="02020603050405020304" pitchFamily="18" charset="0"/>
+            </a:endParaRPr>
+          </a:p>
+        </p:txBody>
+      </p:sp>
+    </p:spTree>
+    <p:extLst>
+      <p:ext uri="{BB962C8B-B14F-4D97-AF65-F5344CB8AC3E}">
+        <p14:creationId xmlns:p14="http://schemas.microsoft.com/office/powerpoint/2010/main" val="1835531764"/>
+      </p:ext>
+    </p:extLst>
+  </p:cSld>
+  <p:clrMapOvr>
+    <a:masterClrMapping/>
+  </p:clrMapOvr>
+  <p:timing>
+    <p:tnLst>
+      <p:par>
+        <p:cTn id="1" dur="indefinite" restart="never" nodeType="tmRoot">
+          <p:childTnLst>
+            <p:seq concurrent="1" nextAc="seek">
+              <p:cTn id="2" dur="indefinite" nodeType="mainSeq">
+                <p:childTnLst>
+                  <p:par>
+                    <p:cTn id="3" fill="hold">
+                      <p:stCondLst>
+                        <p:cond delay="indefinite"/>
+                      </p:stCondLst>
+                      <p:childTnLst>
+                        <p:par>
+                          <p:cTn id="4" fill="hold">
+                            <p:stCondLst>
+                              <p:cond delay="0"/>
+                            </p:stCondLst>
+                            <p:childTnLst>
+                              <p:par>
+                                <p:cTn id="5" presetID="1" presetClass="entr" presetSubtype="0" fill="hold" nodeType="clickEffect">
+                                  <p:stCondLst>
+                                    <p:cond delay="0"/>
+                                  </p:stCondLst>
+                                  <p:childTnLst>
+                                    <p:set>
+                                      <p:cBhvr>
+                                        <p:cTn id="6" dur="1" fill="hold">
+                                          <p:stCondLst>
+                                            <p:cond delay="0"/>
+                                          </p:stCondLst>
+                                        </p:cTn>
+                                        <p:tgtEl>
+                                          <p:spTgt spid="3">
+                                            <p:txEl>
+                                              <p:pRg st="0" end="0"/>
+                                            </p:txEl>
+                                          </p:spTgt>
+                                        </p:tgtEl>
+                                        <p:attrNameLst>
+                                          <p:attrName>style.visibility</p:attrName>
+                                        </p:attrNameLst>
+                                      </p:cBhvr>
+                                      <p:to>
+                                        <p:strVal val="visible"/>
+                                      </p:to>
+                                    </p:set>
+                                  </p:childTnLst>
+                                </p:cTn>
+                              </p:par>
+                            </p:childTnLst>
+                          </p:cTn>
+                        </p:par>
+                      </p:childTnLst>
+                    </p:cTn>
+                  </p:par>
+                </p:childTnLst>
+              </p:cTn>
+              <p:prevCondLst>
+                <p:cond evt="onPrev" delay="0">
+                  <p:tgtEl>
+                    <p:sldTgt/>
+                  </p:tgtEl>
+                </p:cond>
+              </p:prevCondLst>
+              <p:nextCondLst>
+                <p:cond evt="onNext" delay="0">
+                  <p:tgtEl>
+                    <p:sldTgt/>
+                  </p:tgtEl>
+                </p:cond>
+              </p:nextCondLst>
+            </p:seq>
+          </p:childTnLst>
+        </p:cTn>
+      </p:par>
+    </p:tnLst>
+  </p:timing>
+</p:sld>
+</file>
+
+<file path=ppt/slides/slide25.xml><?xml version="1.0" encoding="utf-8"?>
+<p:sld xmlns:a="http://schemas.openxmlformats.org/drawingml/2006/main" xmlns:r="http://schemas.openxmlformats.org/officeDocument/2006/relationships" xmlns:p="http://schemas.openxmlformats.org/presentationml/2006/main">
+  <p:cSld>
+    <p:spTree>
+      <p:nvGrpSpPr>
         <p:cNvPr id="1" name=""/>
         <p:cNvGrpSpPr/>
         <p:nvPr/>
@@ -27936,13 +28440,13 @@
   <p:clrMapOvr>
     <a:masterClrMapping/>
   </p:clrMapOvr>
-  <mc:AlternateContent xmlns:mc="http://schemas.openxmlformats.org/markup-compatibility/2006">
-    <mc:Choice xmlns:p159="http://schemas.microsoft.com/office/powerpoint/2015/09/main" Requires="p159">
+  <mc:AlternateContent xmlns:mc="http://schemas.openxmlformats.org/markup-compatibility/2006" xmlns:p159="http://schemas.microsoft.com/office/powerpoint/2015/09/main">
+    <mc:Choice Requires="p159">
       <p:transition xmlns:p14="http://schemas.microsoft.com/office/powerpoint/2010/main" spd="slow" p14:dur="2000">
         <p159:morph option="byObject"/>
       </p:transition>
     </mc:Choice>
-    <mc:Fallback>
+    <mc:Fallback xmlns="">
       <p:transition spd="slow">
         <p:fade/>
       </p:transition>

</xml_diff>